<commit_message>
Fixed the initial design of hw1 after meeting(4/14)
</commit_message>
<xml_diff>
--- a/hw/hw7/Homework0408_part1.pptx
+++ b/hw/hw7/Homework0408_part1.pptx
@@ -294,7 +294,7 @@
           <a:p>
             <a:fld id="{F4D034DE-C577-4059-9CC6-8E4FAEF7AE3B}" type="datetimeFigureOut">
               <a:rPr lang="zh-TW" altLang="en-US" smtClean="0"/>
-              <a:t>2014/4/13</a:t>
+              <a:t>2014/4/14</a:t>
             </a:fld>
             <a:endParaRPr lang="zh-TW" altLang="en-US"/>
           </a:p>
@@ -464,7 +464,7 @@
           <a:p>
             <a:fld id="{F4D034DE-C577-4059-9CC6-8E4FAEF7AE3B}" type="datetimeFigureOut">
               <a:rPr lang="zh-TW" altLang="en-US" smtClean="0"/>
-              <a:t>2014/4/13</a:t>
+              <a:t>2014/4/14</a:t>
             </a:fld>
             <a:endParaRPr lang="zh-TW" altLang="en-US"/>
           </a:p>
@@ -644,7 +644,7 @@
           <a:p>
             <a:fld id="{F4D034DE-C577-4059-9CC6-8E4FAEF7AE3B}" type="datetimeFigureOut">
               <a:rPr lang="zh-TW" altLang="en-US" smtClean="0"/>
-              <a:t>2014/4/13</a:t>
+              <a:t>2014/4/14</a:t>
             </a:fld>
             <a:endParaRPr lang="zh-TW" altLang="en-US"/>
           </a:p>
@@ -814,7 +814,7 @@
           <a:p>
             <a:fld id="{F4D034DE-C577-4059-9CC6-8E4FAEF7AE3B}" type="datetimeFigureOut">
               <a:rPr lang="zh-TW" altLang="en-US" smtClean="0"/>
-              <a:t>2014/4/13</a:t>
+              <a:t>2014/4/14</a:t>
             </a:fld>
             <a:endParaRPr lang="zh-TW" altLang="en-US"/>
           </a:p>
@@ -1060,7 +1060,7 @@
           <a:p>
             <a:fld id="{F4D034DE-C577-4059-9CC6-8E4FAEF7AE3B}" type="datetimeFigureOut">
               <a:rPr lang="zh-TW" altLang="en-US" smtClean="0"/>
-              <a:t>2014/4/13</a:t>
+              <a:t>2014/4/14</a:t>
             </a:fld>
             <a:endParaRPr lang="zh-TW" altLang="en-US"/>
           </a:p>
@@ -1348,7 +1348,7 @@
           <a:p>
             <a:fld id="{F4D034DE-C577-4059-9CC6-8E4FAEF7AE3B}" type="datetimeFigureOut">
               <a:rPr lang="zh-TW" altLang="en-US" smtClean="0"/>
-              <a:t>2014/4/13</a:t>
+              <a:t>2014/4/14</a:t>
             </a:fld>
             <a:endParaRPr lang="zh-TW" altLang="en-US"/>
           </a:p>
@@ -1770,7 +1770,7 @@
           <a:p>
             <a:fld id="{F4D034DE-C577-4059-9CC6-8E4FAEF7AE3B}" type="datetimeFigureOut">
               <a:rPr lang="zh-TW" altLang="en-US" smtClean="0"/>
-              <a:t>2014/4/13</a:t>
+              <a:t>2014/4/14</a:t>
             </a:fld>
             <a:endParaRPr lang="zh-TW" altLang="en-US"/>
           </a:p>
@@ -1888,7 +1888,7 @@
           <a:p>
             <a:fld id="{F4D034DE-C577-4059-9CC6-8E4FAEF7AE3B}" type="datetimeFigureOut">
               <a:rPr lang="zh-TW" altLang="en-US" smtClean="0"/>
-              <a:t>2014/4/13</a:t>
+              <a:t>2014/4/14</a:t>
             </a:fld>
             <a:endParaRPr lang="zh-TW" altLang="en-US"/>
           </a:p>
@@ -1983,7 +1983,7 @@
           <a:p>
             <a:fld id="{F4D034DE-C577-4059-9CC6-8E4FAEF7AE3B}" type="datetimeFigureOut">
               <a:rPr lang="zh-TW" altLang="en-US" smtClean="0"/>
-              <a:t>2014/4/13</a:t>
+              <a:t>2014/4/14</a:t>
             </a:fld>
             <a:endParaRPr lang="zh-TW" altLang="en-US"/>
           </a:p>
@@ -2260,7 +2260,7 @@
           <a:p>
             <a:fld id="{F4D034DE-C577-4059-9CC6-8E4FAEF7AE3B}" type="datetimeFigureOut">
               <a:rPr lang="zh-TW" altLang="en-US" smtClean="0"/>
-              <a:t>2014/4/13</a:t>
+              <a:t>2014/4/14</a:t>
             </a:fld>
             <a:endParaRPr lang="zh-TW" altLang="en-US"/>
           </a:p>
@@ -2513,7 +2513,7 @@
           <a:p>
             <a:fld id="{F4D034DE-C577-4059-9CC6-8E4FAEF7AE3B}" type="datetimeFigureOut">
               <a:rPr lang="zh-TW" altLang="en-US" smtClean="0"/>
-              <a:t>2014/4/13</a:t>
+              <a:t>2014/4/14</a:t>
             </a:fld>
             <a:endParaRPr lang="zh-TW" altLang="en-US"/>
           </a:p>
@@ -2726,7 +2726,7 @@
           <a:p>
             <a:fld id="{F4D034DE-C577-4059-9CC6-8E4FAEF7AE3B}" type="datetimeFigureOut">
               <a:rPr lang="zh-TW" altLang="en-US" smtClean="0"/>
-              <a:t>2014/4/13</a:t>
+              <a:t>2014/4/14</a:t>
             </a:fld>
             <a:endParaRPr lang="zh-TW" altLang="en-US"/>
           </a:p>
@@ -3501,35 +3501,6 @@
       </p:sp>
       <p:pic>
         <p:nvPicPr>
-          <p:cNvPr id="4" name="內容版面配置區 3"/>
-          <p:cNvPicPr>
-            <a:picLocks noGrp="1" noChangeAspect="1"/>
-          </p:cNvPicPr>
-          <p:nvPr>
-            <p:ph idx="1"/>
-          </p:nvPr>
-        </p:nvPicPr>
-        <p:blipFill>
-          <a:blip r:embed="rId2">
-            <a:extLst>
-              <a:ext uri="{28A0092B-C50C-407E-A947-70E740481C1C}">
-                <a14:useLocalDpi xmlns:a14="http://schemas.microsoft.com/office/drawing/2010/main" val="0"/>
-              </a:ext>
-            </a:extLst>
-          </a:blip>
-          <a:stretch>
-            <a:fillRect/>
-          </a:stretch>
-        </p:blipFill>
-        <p:spPr>
-          <a:xfrm>
-            <a:off x="1403648" y="1772816"/>
-            <a:ext cx="5948640" cy="3885318"/>
-          </a:xfrm>
-        </p:spPr>
-      </p:pic>
-      <p:pic>
-        <p:nvPicPr>
           <p:cNvPr id="2050" name="Picture 2"/>
           <p:cNvPicPr>
             <a:picLocks noChangeAspect="1" noChangeArrowheads="1"/>
@@ -3537,7 +3508,7 @@
           <p:nvPr/>
         </p:nvPicPr>
         <p:blipFill>
-          <a:blip r:embed="rId3">
+          <a:blip r:embed="rId2">
             <a:extLst>
               <a:ext uri="{28A0092B-C50C-407E-A947-70E740481C1C}">
                 <a14:useLocalDpi xmlns:a14="http://schemas.microsoft.com/office/drawing/2010/main" val="0"/>
@@ -3582,6 +3553,35 @@
           </a:extLst>
         </p:spPr>
       </p:pic>
+      <p:pic>
+        <p:nvPicPr>
+          <p:cNvPr id="5" name="內容版面配置區 4"/>
+          <p:cNvPicPr>
+            <a:picLocks noGrp="1" noChangeAspect="1"/>
+          </p:cNvPicPr>
+          <p:nvPr>
+            <p:ph idx="1"/>
+          </p:nvPr>
+        </p:nvPicPr>
+        <p:blipFill>
+          <a:blip r:embed="rId3">
+            <a:extLst>
+              <a:ext uri="{28A0092B-C50C-407E-A947-70E740481C1C}">
+                <a14:useLocalDpi xmlns:a14="http://schemas.microsoft.com/office/drawing/2010/main" val="0"/>
+              </a:ext>
+            </a:extLst>
+          </a:blip>
+          <a:stretch>
+            <a:fillRect/>
+          </a:stretch>
+        </p:blipFill>
+        <p:spPr>
+          <a:xfrm>
+            <a:off x="431540" y="1580810"/>
+            <a:ext cx="8280920" cy="4952315"/>
+          </a:xfrm>
+        </p:spPr>
+      </p:pic>
     </p:spTree>
     <p:extLst>
       <p:ext uri="{BB962C8B-B14F-4D97-AF65-F5344CB8AC3E}">
@@ -3640,35 +3640,6 @@
       </p:sp>
       <p:pic>
         <p:nvPicPr>
-          <p:cNvPr id="4" name="內容版面配置區 3"/>
-          <p:cNvPicPr>
-            <a:picLocks noGrp="1" noChangeAspect="1"/>
-          </p:cNvPicPr>
-          <p:nvPr>
-            <p:ph idx="1"/>
-          </p:nvPr>
-        </p:nvPicPr>
-        <p:blipFill>
-          <a:blip r:embed="rId2">
-            <a:extLst>
-              <a:ext uri="{28A0092B-C50C-407E-A947-70E740481C1C}">
-                <a14:useLocalDpi xmlns:a14="http://schemas.microsoft.com/office/drawing/2010/main" val="0"/>
-              </a:ext>
-            </a:extLst>
-          </a:blip>
-          <a:stretch>
-            <a:fillRect/>
-          </a:stretch>
-        </p:blipFill>
-        <p:spPr>
-          <a:xfrm>
-            <a:off x="1331640" y="1772816"/>
-            <a:ext cx="6097419" cy="4011460"/>
-          </a:xfrm>
-        </p:spPr>
-      </p:pic>
-      <p:pic>
-        <p:nvPicPr>
           <p:cNvPr id="3074" name="Picture 2"/>
           <p:cNvPicPr>
             <a:picLocks noChangeAspect="1" noChangeArrowheads="1"/>
@@ -3676,7 +3647,7 @@
           <p:nvPr/>
         </p:nvPicPr>
         <p:blipFill>
-          <a:blip r:embed="rId3">
+          <a:blip r:embed="rId2">
             <a:extLst>
               <a:ext uri="{28A0092B-C50C-407E-A947-70E740481C1C}">
                 <a14:useLocalDpi xmlns:a14="http://schemas.microsoft.com/office/drawing/2010/main" val="0"/>
@@ -3721,6 +3692,35 @@
           </a:extLst>
         </p:spPr>
       </p:pic>
+      <p:pic>
+        <p:nvPicPr>
+          <p:cNvPr id="5" name="內容版面配置區 4"/>
+          <p:cNvPicPr>
+            <a:picLocks noGrp="1" noChangeAspect="1"/>
+          </p:cNvPicPr>
+          <p:nvPr>
+            <p:ph idx="1"/>
+          </p:nvPr>
+        </p:nvPicPr>
+        <p:blipFill>
+          <a:blip r:embed="rId3">
+            <a:extLst>
+              <a:ext uri="{28A0092B-C50C-407E-A947-70E740481C1C}">
+                <a14:useLocalDpi xmlns:a14="http://schemas.microsoft.com/office/drawing/2010/main" val="0"/>
+              </a:ext>
+            </a:extLst>
+          </a:blip>
+          <a:stretch>
+            <a:fillRect/>
+          </a:stretch>
+        </p:blipFill>
+        <p:spPr>
+          <a:xfrm>
+            <a:off x="647564" y="1537747"/>
+            <a:ext cx="7848872" cy="4693933"/>
+          </a:xfrm>
+        </p:spPr>
+      </p:pic>
     </p:spTree>
     <p:extLst>
       <p:ext uri="{BB962C8B-B14F-4D97-AF65-F5344CB8AC3E}">
@@ -3779,35 +3779,6 @@
       </p:sp>
       <p:pic>
         <p:nvPicPr>
-          <p:cNvPr id="4" name="內容版面配置區 3"/>
-          <p:cNvPicPr>
-            <a:picLocks noGrp="1" noChangeAspect="1"/>
-          </p:cNvPicPr>
-          <p:nvPr>
-            <p:ph idx="1"/>
-          </p:nvPr>
-        </p:nvPicPr>
-        <p:blipFill>
-          <a:blip r:embed="rId2">
-            <a:extLst>
-              <a:ext uri="{28A0092B-C50C-407E-A947-70E740481C1C}">
-                <a14:useLocalDpi xmlns:a14="http://schemas.microsoft.com/office/drawing/2010/main" val="0"/>
-              </a:ext>
-            </a:extLst>
-          </a:blip>
-          <a:stretch>
-            <a:fillRect/>
-          </a:stretch>
-        </p:blipFill>
-        <p:spPr>
-          <a:xfrm>
-            <a:off x="64657" y="1556792"/>
-            <a:ext cx="8865624" cy="4536504"/>
-          </a:xfrm>
-        </p:spPr>
-      </p:pic>
-      <p:pic>
-        <p:nvPicPr>
           <p:cNvPr id="4098" name="Picture 2"/>
           <p:cNvPicPr>
             <a:picLocks noChangeAspect="1" noChangeArrowheads="1"/>
@@ -3815,7 +3786,7 @@
           <p:nvPr/>
         </p:nvPicPr>
         <p:blipFill>
-          <a:blip r:embed="rId3">
+          <a:blip r:embed="rId2">
             <a:extLst>
               <a:ext uri="{28A0092B-C50C-407E-A947-70E740481C1C}">
                 <a14:useLocalDpi xmlns:a14="http://schemas.microsoft.com/office/drawing/2010/main" val="0"/>
@@ -3858,6 +3829,35 @@
               </a14:hiddenLine>
             </a:ext>
           </a:extLst>
+        </p:spPr>
+      </p:pic>
+      <p:pic>
+        <p:nvPicPr>
+          <p:cNvPr id="5" name="內容版面配置區 4"/>
+          <p:cNvPicPr>
+            <a:picLocks noGrp="1" noChangeAspect="1"/>
+          </p:cNvPicPr>
+          <p:nvPr>
+            <p:ph idx="1"/>
+          </p:nvPr>
+        </p:nvPicPr>
+        <p:blipFill>
+          <a:blip r:embed="rId3">
+            <a:extLst>
+              <a:ext uri="{28A0092B-C50C-407E-A947-70E740481C1C}">
+                <a14:useLocalDpi xmlns:a14="http://schemas.microsoft.com/office/drawing/2010/main" val="0"/>
+              </a:ext>
+            </a:extLst>
+          </a:blip>
+          <a:stretch>
+            <a:fillRect/>
+          </a:stretch>
+        </p:blipFill>
+        <p:spPr>
+          <a:xfrm>
+            <a:off x="467544" y="1314370"/>
+            <a:ext cx="8208912" cy="5188652"/>
+          </a:xfrm>
         </p:spPr>
       </p:pic>
     </p:spTree>
@@ -3972,7 +3972,7 @@
       </p:pic>
       <p:pic>
         <p:nvPicPr>
-          <p:cNvPr id="8" name="內容版面配置區 7"/>
+          <p:cNvPr id="6" name="內容版面配置區 5"/>
           <p:cNvPicPr>
             <a:picLocks noGrp="1" noChangeAspect="1"/>
           </p:cNvPicPr>
@@ -3994,8 +3994,8 @@
         </p:blipFill>
         <p:spPr>
           <a:xfrm>
-            <a:off x="1115616" y="2332037"/>
-            <a:ext cx="7262948" cy="4525963"/>
+            <a:off x="1403648" y="2332037"/>
+            <a:ext cx="6675245" cy="4525963"/>
           </a:xfrm>
         </p:spPr>
       </p:pic>
@@ -4036,45 +4036,16 @@
           <a:chExt cx="0" cy="0"/>
         </a:xfrm>
       </p:grpSpPr>
-      <p:pic>
-        <p:nvPicPr>
-          <p:cNvPr id="25" name="內容版面配置區 24"/>
-          <p:cNvPicPr>
-            <a:picLocks noGrp="1" noChangeAspect="1"/>
-          </p:cNvPicPr>
-          <p:nvPr>
-            <p:ph idx="1"/>
-          </p:nvPr>
-        </p:nvPicPr>
-        <p:blipFill>
-          <a:blip r:embed="rId2">
-            <a:extLst>
-              <a:ext uri="{28A0092B-C50C-407E-A947-70E740481C1C}">
-                <a14:useLocalDpi xmlns:a14="http://schemas.microsoft.com/office/drawing/2010/main" val="0"/>
-              </a:ext>
-            </a:extLst>
-          </a:blip>
-          <a:stretch>
-            <a:fillRect/>
-          </a:stretch>
-        </p:blipFill>
+      <p:sp>
+        <p:nvSpPr>
+          <p:cNvPr id="7" name="文字方塊 6"/>
+          <p:cNvSpPr txBox="1"/>
+          <p:nvPr/>
+        </p:nvSpPr>
         <p:spPr>
           <a:xfrm>
-            <a:off x="456046" y="1645643"/>
-            <a:ext cx="8364426" cy="5212357"/>
-          </a:xfrm>
-        </p:spPr>
-      </p:pic>
-      <p:sp>
-        <p:nvSpPr>
-          <p:cNvPr id="3" name="文字方塊 2"/>
-          <p:cNvSpPr txBox="1"/>
-          <p:nvPr/>
-        </p:nvSpPr>
-        <p:spPr>
-          <a:xfrm>
-            <a:off x="107504" y="260648"/>
-            <a:ext cx="2870979" cy="1384995"/>
+            <a:off x="3104228" y="260648"/>
+            <a:ext cx="3079754" cy="2031325"/>
           </a:xfrm>
           <a:prstGeom prst="rect">
             <a:avLst/>
@@ -4100,11 +4071,21 @@
           <a:p>
             <a:r>
               <a:rPr lang="en-US" altLang="zh-TW" sz="1400" dirty="0"/>
-              <a:t> </a:t>
-            </a:r>
-            <a:r>
-              <a:rPr lang="en-US" altLang="zh-TW" sz="1400" dirty="0" smtClean="0"/>
-              <a:t>   </a:t>
+              <a:t>     lines = new Line[</a:t>
+            </a:r>
+            <a:r>
+              <a:rPr lang="en-US" altLang="zh-TW" sz="1400" dirty="0" err="1"/>
+              <a:t>MaxLine</a:t>
+            </a:r>
+            <a:r>
+              <a:rPr lang="en-US" altLang="zh-TW" sz="1400" dirty="0"/>
+              <a:t>];</a:t>
+            </a:r>
+          </a:p>
+          <a:p>
+            <a:r>
+              <a:rPr lang="en-US" altLang="zh-TW" sz="1400" dirty="0" smtClean="0"/>
+              <a:t>    </a:t>
             </a:r>
             <a:r>
               <a:rPr lang="en-US" altLang="zh-TW" sz="1400" dirty="0" err="1" smtClean="0"/>
@@ -4112,8 +4093,13 @@
             </a:r>
             <a:r>
               <a:rPr lang="en-US" altLang="zh-TW" sz="1400" dirty="0" smtClean="0"/>
-              <a:t> components{</a:t>
-            </a:r>
+              <a:t> paragraph</a:t>
+            </a:r>
+            <a:r>
+              <a:rPr lang="en-US" altLang="zh-TW" sz="1400" dirty="0" smtClean="0"/>
+              <a:t>{</a:t>
+            </a:r>
+            <a:endParaRPr lang="en-US" altLang="zh-TW" sz="1400" dirty="0" smtClean="0"/>
           </a:p>
           <a:p>
             <a:r>
@@ -4122,7 +4108,15 @@
             </a:r>
             <a:r>
               <a:rPr lang="en-US" altLang="zh-TW" sz="1400" dirty="0" smtClean="0"/>
-              <a:t>       if(determine())</a:t>
+              <a:t>       </a:t>
+            </a:r>
+            <a:r>
+              <a:rPr lang="en-US" altLang="zh-TW" sz="1400" dirty="0" err="1" smtClean="0"/>
+              <a:t>foreach</a:t>
+            </a:r>
+            <a:r>
+              <a:rPr lang="en-US" altLang="zh-TW" sz="1400" dirty="0" smtClean="0"/>
+              <a:t> components in paragraph{</a:t>
             </a:r>
           </a:p>
           <a:p>
@@ -4132,198 +4126,45 @@
             </a:r>
             <a:r>
               <a:rPr lang="en-US" altLang="zh-TW" sz="1400" dirty="0" smtClean="0"/>
-              <a:t>           </a:t>
+              <a:t>           lines[</a:t>
             </a:r>
             <a:r>
               <a:rPr lang="en-US" altLang="zh-TW" sz="1400" dirty="0" err="1" smtClean="0"/>
-              <a:t>insertLineBreak</a:t>
-            </a:r>
-            <a:r>
-              <a:rPr lang="en-US" altLang="zh-TW" sz="1400" dirty="0" smtClean="0"/>
-              <a:t>();</a:t>
-            </a:r>
-          </a:p>
-          <a:p>
-            <a:r>
-              <a:rPr lang="en-US" altLang="zh-TW" sz="1400" dirty="0" smtClean="0"/>
-              <a:t>    }</a:t>
-            </a:r>
-          </a:p>
-          <a:p>
+              <a:t>lineHead</a:t>
+            </a:r>
+            <a:r>
+              <a:rPr lang="en-US" altLang="zh-TW" sz="1400" dirty="0" smtClean="0"/>
+              <a:t>].add(component);</a:t>
+            </a:r>
+            <a:endParaRPr lang="en-US" altLang="zh-TW" sz="1400" dirty="0" smtClean="0"/>
+          </a:p>
+          <a:p>
+            <a:r>
+              <a:rPr lang="en-US" altLang="zh-TW" sz="1400" dirty="0" smtClean="0"/>
+              <a:t>        }</a:t>
+            </a:r>
+            <a:endParaRPr lang="en-US" altLang="zh-TW" sz="1400" dirty="0" smtClean="0"/>
+          </a:p>
+          <a:p>
+            <a:r>
+              <a:rPr lang="en-US" altLang="zh-TW" sz="1400" dirty="0" smtClean="0"/>
+              <a:t>    </a:t>
+            </a:r>
+            <a:r>
+              <a:rPr lang="en-US" altLang="zh-TW" sz="1400" dirty="0" smtClean="0"/>
+              <a:t>}</a:t>
+            </a:r>
+          </a:p>
+          <a:p>
+            <a:r>
+              <a:rPr lang="en-US" altLang="zh-TW" sz="1400" dirty="0" smtClean="0"/>
+              <a:t>     </a:t>
+            </a:r>
             <a:r>
               <a:rPr lang="en-US" altLang="zh-TW" sz="1400" dirty="0"/>
-              <a:t>}</a:t>
-            </a:r>
-            <a:endParaRPr lang="zh-TW" altLang="en-US" sz="1400" dirty="0"/>
-          </a:p>
-        </p:txBody>
-      </p:sp>
-      <p:sp>
-        <p:nvSpPr>
-          <p:cNvPr id="7" name="文字方塊 6"/>
-          <p:cNvSpPr txBox="1"/>
-          <p:nvPr/>
-        </p:nvSpPr>
-        <p:spPr>
-          <a:xfrm>
-            <a:off x="3104228" y="260648"/>
-            <a:ext cx="2870979" cy="1169551"/>
-          </a:xfrm>
-          <a:prstGeom prst="rect">
-            <a:avLst/>
-          </a:prstGeom>
-          <a:noFill/>
-          <a:ln>
-            <a:solidFill>
-              <a:schemeClr val="tx1"/>
-            </a:solidFill>
-          </a:ln>
-        </p:spPr>
-        <p:txBody>
-          <a:bodyPr wrap="none" rtlCol="0">
-            <a:spAutoFit/>
-          </a:bodyPr>
-          <a:lstStyle/>
-          <a:p>
-            <a:r>
-              <a:rPr lang="en-US" altLang="zh-TW" sz="1400" dirty="0" smtClean="0"/>
-              <a:t>arrange(Component [] components){</a:t>
-            </a:r>
-          </a:p>
-          <a:p>
-            <a:r>
-              <a:rPr lang="en-US" altLang="zh-TW" sz="1400" dirty="0"/>
-              <a:t> </a:t>
-            </a:r>
-            <a:r>
-              <a:rPr lang="en-US" altLang="zh-TW" sz="1400" dirty="0" smtClean="0"/>
-              <a:t>   </a:t>
-            </a:r>
-            <a:r>
-              <a:rPr lang="en-US" altLang="zh-TW" sz="1400" dirty="0" err="1" smtClean="0"/>
-              <a:t>foreach</a:t>
-            </a:r>
-            <a:r>
-              <a:rPr lang="en-US" altLang="zh-TW" sz="1400" dirty="0" smtClean="0"/>
-              <a:t> paragraph{</a:t>
-            </a:r>
-          </a:p>
-          <a:p>
-            <a:r>
-              <a:rPr lang="en-US" altLang="zh-TW" sz="1400" dirty="0"/>
-              <a:t> </a:t>
-            </a:r>
-            <a:r>
-              <a:rPr lang="en-US" altLang="zh-TW" sz="1400" dirty="0" smtClean="0"/>
-              <a:t>       </a:t>
-            </a:r>
-            <a:r>
-              <a:rPr lang="en-US" altLang="zh-TW" sz="1400" dirty="0" err="1" smtClean="0"/>
-              <a:t>insertLineBreak</a:t>
-            </a:r>
-            <a:r>
-              <a:rPr lang="en-US" altLang="zh-TW" sz="1400" dirty="0" smtClean="0"/>
-              <a:t>();</a:t>
-            </a:r>
-          </a:p>
-          <a:p>
-            <a:r>
-              <a:rPr lang="en-US" altLang="zh-TW" sz="1400" dirty="0" smtClean="0"/>
-              <a:t>    }</a:t>
-            </a:r>
-          </a:p>
-          <a:p>
-            <a:r>
-              <a:rPr lang="en-US" altLang="zh-TW" sz="1400" dirty="0"/>
-              <a:t>}</a:t>
-            </a:r>
-            <a:endParaRPr lang="zh-TW" altLang="en-US" sz="1400" dirty="0"/>
-          </a:p>
-        </p:txBody>
-      </p:sp>
-      <p:sp>
-        <p:nvSpPr>
-          <p:cNvPr id="8" name="文字方塊 7"/>
-          <p:cNvSpPr txBox="1"/>
-          <p:nvPr/>
-        </p:nvSpPr>
-        <p:spPr>
-          <a:xfrm>
-            <a:off x="6156176" y="260647"/>
-            <a:ext cx="2870979" cy="1384995"/>
-          </a:xfrm>
-          <a:prstGeom prst="rect">
-            <a:avLst/>
-          </a:prstGeom>
-          <a:noFill/>
-          <a:ln>
-            <a:solidFill>
-              <a:schemeClr val="tx1"/>
-            </a:solidFill>
-          </a:ln>
-        </p:spPr>
-        <p:txBody>
-          <a:bodyPr wrap="none" rtlCol="0">
-            <a:spAutoFit/>
-          </a:bodyPr>
-          <a:lstStyle/>
-          <a:p>
-            <a:r>
-              <a:rPr lang="en-US" altLang="zh-TW" sz="1400" dirty="0" smtClean="0"/>
-              <a:t>arrange(Component [] components){</a:t>
-            </a:r>
-          </a:p>
-          <a:p>
-            <a:r>
-              <a:rPr lang="en-US" altLang="zh-TW" sz="1400" dirty="0"/>
-              <a:t> </a:t>
-            </a:r>
-            <a:r>
-              <a:rPr lang="en-US" altLang="zh-TW" sz="1400" dirty="0" smtClean="0"/>
-              <a:t>   </a:t>
-            </a:r>
-            <a:r>
-              <a:rPr lang="en-US" altLang="zh-TW" sz="1400" dirty="0" err="1" smtClean="0"/>
-              <a:t>foreach</a:t>
-            </a:r>
-            <a:r>
-              <a:rPr lang="en-US" altLang="zh-TW" sz="1400" dirty="0" smtClean="0"/>
-              <a:t> components{</a:t>
-            </a:r>
-          </a:p>
-          <a:p>
-            <a:r>
-              <a:rPr lang="en-US" altLang="zh-TW" sz="1400" dirty="0"/>
-              <a:t> </a:t>
-            </a:r>
-            <a:r>
-              <a:rPr lang="en-US" altLang="zh-TW" sz="1400" dirty="0" smtClean="0"/>
-              <a:t>       if(determine())</a:t>
-            </a:r>
-          </a:p>
-          <a:p>
-            <a:r>
-              <a:rPr lang="en-US" altLang="zh-TW" sz="1400" dirty="0"/>
-              <a:t> </a:t>
-            </a:r>
-            <a:r>
-              <a:rPr lang="en-US" altLang="zh-TW" sz="1400" dirty="0" smtClean="0"/>
-              <a:t>           </a:t>
-            </a:r>
-            <a:r>
-              <a:rPr lang="en-US" altLang="zh-TW" sz="1400" dirty="0" err="1" smtClean="0"/>
-              <a:t>insertLineBreak</a:t>
-            </a:r>
-            <a:r>
-              <a:rPr lang="en-US" altLang="zh-TW" sz="1400" dirty="0" smtClean="0"/>
-              <a:t>();</a:t>
-            </a:r>
-          </a:p>
-          <a:p>
-            <a:r>
-              <a:rPr lang="en-US" altLang="zh-TW" sz="1400" dirty="0" smtClean="0"/>
-              <a:t>    }</a:t>
-            </a:r>
+              <a:t>return lines;</a:t>
+            </a:r>
+            <a:endParaRPr lang="en-US" altLang="zh-TW" sz="1400" dirty="0" smtClean="0"/>
           </a:p>
           <a:p>
             <a:r>
@@ -4344,8 +4185,8 @@
         </p:nvCxnSpPr>
         <p:spPr>
           <a:xfrm flipH="1">
-            <a:off x="1542993" y="1645643"/>
-            <a:ext cx="1" cy="919261"/>
+            <a:off x="1542995" y="2507417"/>
+            <a:ext cx="104386" cy="57487"/>
           </a:xfrm>
           <a:prstGeom prst="line">
             <a:avLst/>
@@ -4381,8 +4222,8 @@
         </p:nvCxnSpPr>
         <p:spPr>
           <a:xfrm flipH="1">
-            <a:off x="3104228" y="1430199"/>
-            <a:ext cx="1435490" cy="2655294"/>
+            <a:off x="3104231" y="2291973"/>
+            <a:ext cx="1539874" cy="1793520"/>
           </a:xfrm>
           <a:prstGeom prst="line">
             <a:avLst/>
@@ -4416,12 +4257,12 @@
         </p:nvCxnSpPr>
         <p:spPr>
           <a:xfrm rot="10800000" flipV="1">
-            <a:off x="2411760" y="1645642"/>
-            <a:ext cx="5904657" cy="5023718"/>
+            <a:off x="2267744" y="1645642"/>
+            <a:ext cx="6048674" cy="4735686"/>
           </a:xfrm>
           <a:prstGeom prst="bentConnector3">
             <a:avLst>
-              <a:gd name="adj1" fmla="val -5411"/>
+              <a:gd name="adj1" fmla="val -9997"/>
             </a:avLst>
           </a:prstGeom>
           <a:ln w="28575">
@@ -4445,6 +4286,563 @@
           </a:fontRef>
         </p:style>
       </p:cxnSp>
+      <p:pic>
+        <p:nvPicPr>
+          <p:cNvPr id="4" name="內容版面配置區 3"/>
+          <p:cNvPicPr>
+            <a:picLocks noGrp="1" noChangeAspect="1"/>
+          </p:cNvPicPr>
+          <p:nvPr>
+            <p:ph idx="1"/>
+          </p:nvPr>
+        </p:nvPicPr>
+        <p:blipFill>
+          <a:blip r:embed="rId2">
+            <a:extLst>
+              <a:ext uri="{28A0092B-C50C-407E-A947-70E740481C1C}">
+                <a14:useLocalDpi xmlns:a14="http://schemas.microsoft.com/office/drawing/2010/main" val="0"/>
+              </a:ext>
+            </a:extLst>
+          </a:blip>
+          <a:stretch>
+            <a:fillRect/>
+          </a:stretch>
+        </p:blipFill>
+        <p:spPr>
+          <a:xfrm>
+            <a:off x="543273" y="1220836"/>
+            <a:ext cx="7992887" cy="5419354"/>
+          </a:xfrm>
+        </p:spPr>
+      </p:pic>
+      <p:sp>
+        <p:nvSpPr>
+          <p:cNvPr id="14" name="文字方塊 13"/>
+          <p:cNvSpPr txBox="1"/>
+          <p:nvPr/>
+        </p:nvSpPr>
+        <p:spPr>
+          <a:xfrm>
+            <a:off x="3347864" y="5526524"/>
+            <a:ext cx="3096682" cy="738664"/>
+          </a:xfrm>
+          <a:prstGeom prst="rect">
+            <a:avLst/>
+          </a:prstGeom>
+          <a:solidFill>
+            <a:schemeClr val="bg1"/>
+          </a:solidFill>
+          <a:ln>
+            <a:solidFill>
+              <a:schemeClr val="tx1"/>
+            </a:solidFill>
+          </a:ln>
+        </p:spPr>
+        <p:txBody>
+          <a:bodyPr wrap="none" rtlCol="0">
+            <a:spAutoFit/>
+          </a:bodyPr>
+          <a:lstStyle/>
+          <a:p>
+            <a:r>
+              <a:rPr lang="en-US" altLang="zh-TW" sz="1400" dirty="0" smtClean="0"/>
+              <a:t>arrange(Strategy strategy){</a:t>
+            </a:r>
+          </a:p>
+          <a:p>
+            <a:r>
+              <a:rPr lang="en-US" altLang="zh-TW" sz="1400" dirty="0"/>
+              <a:t> </a:t>
+            </a:r>
+            <a:r>
+              <a:rPr lang="en-US" altLang="zh-TW" sz="1400" dirty="0" smtClean="0"/>
+              <a:t>   return </a:t>
+            </a:r>
+            <a:r>
+              <a:rPr lang="en-US" altLang="zh-TW" sz="1400" dirty="0" err="1" smtClean="0"/>
+              <a:t>strategy.arrange</a:t>
+            </a:r>
+            <a:r>
+              <a:rPr lang="en-US" altLang="zh-TW" sz="1400" dirty="0" smtClean="0"/>
+              <a:t>(components);</a:t>
+            </a:r>
+            <a:endParaRPr lang="en-US" altLang="zh-TW" sz="1400" dirty="0" smtClean="0"/>
+          </a:p>
+          <a:p>
+            <a:r>
+              <a:rPr lang="en-US" altLang="zh-TW" sz="1400" dirty="0"/>
+              <a:t>}</a:t>
+            </a:r>
+            <a:endParaRPr lang="zh-TW" altLang="en-US" sz="1400" dirty="0"/>
+          </a:p>
+        </p:txBody>
+      </p:sp>
+      <p:cxnSp>
+        <p:nvCxnSpPr>
+          <p:cNvPr id="13" name="直線接點 12"/>
+          <p:cNvCxnSpPr>
+            <a:stCxn id="14" idx="0"/>
+          </p:cNvCxnSpPr>
+          <p:nvPr/>
+        </p:nvCxnSpPr>
+        <p:spPr>
+          <a:xfrm flipV="1">
+            <a:off x="4896205" y="4725144"/>
+            <a:ext cx="1764027" cy="801380"/>
+          </a:xfrm>
+          <a:prstGeom prst="line">
+            <a:avLst/>
+          </a:prstGeom>
+          <a:ln w="19050">
+            <a:solidFill>
+              <a:srgbClr val="FF0000"/>
+            </a:solidFill>
+          </a:ln>
+        </p:spPr>
+        <p:style>
+          <a:lnRef idx="1">
+            <a:schemeClr val="accent1"/>
+          </a:lnRef>
+          <a:fillRef idx="0">
+            <a:schemeClr val="accent1"/>
+          </a:fillRef>
+          <a:effectRef idx="0">
+            <a:schemeClr val="accent1"/>
+          </a:effectRef>
+          <a:fontRef idx="minor">
+            <a:schemeClr val="tx1"/>
+          </a:fontRef>
+        </p:style>
+      </p:cxnSp>
+      <p:cxnSp>
+        <p:nvCxnSpPr>
+          <p:cNvPr id="17" name="直線接點 16"/>
+          <p:cNvCxnSpPr/>
+          <p:nvPr/>
+        </p:nvCxnSpPr>
+        <p:spPr>
+          <a:xfrm>
+            <a:off x="1612115" y="1916832"/>
+            <a:ext cx="0" cy="375141"/>
+          </a:xfrm>
+          <a:prstGeom prst="line">
+            <a:avLst/>
+          </a:prstGeom>
+          <a:ln w="28575">
+            <a:solidFill>
+              <a:srgbClr val="FF0000"/>
+            </a:solidFill>
+          </a:ln>
+        </p:spPr>
+        <p:style>
+          <a:lnRef idx="1">
+            <a:schemeClr val="accent1"/>
+          </a:lnRef>
+          <a:fillRef idx="0">
+            <a:schemeClr val="accent1"/>
+          </a:fillRef>
+          <a:effectRef idx="0">
+            <a:schemeClr val="accent1"/>
+          </a:effectRef>
+          <a:fontRef idx="minor">
+            <a:schemeClr val="tx1"/>
+          </a:fontRef>
+        </p:style>
+      </p:cxnSp>
+      <p:sp>
+        <p:nvSpPr>
+          <p:cNvPr id="19" name="文字方塊 18"/>
+          <p:cNvSpPr txBox="1"/>
+          <p:nvPr/>
+        </p:nvSpPr>
+        <p:spPr>
+          <a:xfrm>
+            <a:off x="6126127" y="260648"/>
+            <a:ext cx="3079754" cy="2677656"/>
+          </a:xfrm>
+          <a:prstGeom prst="rect">
+            <a:avLst/>
+          </a:prstGeom>
+          <a:solidFill>
+            <a:schemeClr val="bg1"/>
+          </a:solidFill>
+          <a:ln>
+            <a:solidFill>
+              <a:schemeClr val="tx1"/>
+            </a:solidFill>
+          </a:ln>
+        </p:spPr>
+        <p:txBody>
+          <a:bodyPr wrap="none" rtlCol="0">
+            <a:spAutoFit/>
+          </a:bodyPr>
+          <a:lstStyle/>
+          <a:p>
+            <a:r>
+              <a:rPr lang="en-US" altLang="zh-TW" sz="1400" dirty="0" smtClean="0"/>
+              <a:t>arrange(Component </a:t>
+            </a:r>
+            <a:r>
+              <a:rPr lang="en-US" altLang="zh-TW" sz="1400" dirty="0" smtClean="0"/>
+              <a:t>[] components</a:t>
+            </a:r>
+            <a:r>
+              <a:rPr lang="en-US" altLang="zh-TW" sz="1400" dirty="0" smtClean="0"/>
+              <a:t>){</a:t>
+            </a:r>
+          </a:p>
+          <a:p>
+            <a:r>
+              <a:rPr lang="en-US" altLang="zh-TW" sz="1400" dirty="0"/>
+              <a:t> </a:t>
+            </a:r>
+            <a:r>
+              <a:rPr lang="en-US" altLang="zh-TW" sz="1400" dirty="0" smtClean="0"/>
+              <a:t>   </a:t>
+            </a:r>
+            <a:r>
+              <a:rPr lang="en-US" altLang="zh-TW" sz="1400" dirty="0"/>
+              <a:t>lines = new Line[</a:t>
+            </a:r>
+            <a:r>
+              <a:rPr lang="en-US" altLang="zh-TW" sz="1400" dirty="0" err="1"/>
+              <a:t>MaxLine</a:t>
+            </a:r>
+            <a:r>
+              <a:rPr lang="en-US" altLang="zh-TW" sz="1400" dirty="0" smtClean="0"/>
+              <a:t>];</a:t>
+            </a:r>
+          </a:p>
+          <a:p>
+            <a:r>
+              <a:rPr lang="en-US" altLang="zh-TW" sz="1400" dirty="0"/>
+              <a:t> </a:t>
+            </a:r>
+            <a:r>
+              <a:rPr lang="en-US" altLang="zh-TW" sz="1400" dirty="0" smtClean="0"/>
+              <a:t>   count=0;</a:t>
+            </a:r>
+            <a:endParaRPr lang="en-US" altLang="zh-TW" sz="1400" dirty="0" smtClean="0"/>
+          </a:p>
+          <a:p>
+            <a:r>
+              <a:rPr lang="en-US" altLang="zh-TW" sz="1400" dirty="0"/>
+              <a:t> </a:t>
+            </a:r>
+            <a:r>
+              <a:rPr lang="en-US" altLang="zh-TW" sz="1400" dirty="0" smtClean="0"/>
+              <a:t>   </a:t>
+            </a:r>
+            <a:r>
+              <a:rPr lang="en-US" altLang="zh-TW" sz="1400" dirty="0" err="1" smtClean="0"/>
+              <a:t>foreach</a:t>
+            </a:r>
+            <a:r>
+              <a:rPr lang="en-US" altLang="zh-TW" sz="1400" dirty="0" smtClean="0"/>
+              <a:t> </a:t>
+            </a:r>
+            <a:r>
+              <a:rPr lang="en-US" altLang="zh-TW" sz="1400" dirty="0" smtClean="0"/>
+              <a:t>component{</a:t>
+            </a:r>
+            <a:endParaRPr lang="en-US" altLang="zh-TW" sz="1400" dirty="0" smtClean="0"/>
+          </a:p>
+          <a:p>
+            <a:r>
+              <a:rPr lang="en-US" altLang="zh-TW" sz="1400" dirty="0"/>
+              <a:t> </a:t>
+            </a:r>
+            <a:r>
+              <a:rPr lang="en-US" altLang="zh-TW" sz="1400" dirty="0" smtClean="0"/>
+              <a:t>       </a:t>
+            </a:r>
+            <a:r>
+              <a:rPr lang="en-US" altLang="zh-TW" sz="1400" dirty="0" smtClean="0"/>
+              <a:t>if(count++ &lt;= </a:t>
+            </a:r>
+            <a:r>
+              <a:rPr lang="en-US" altLang="zh-TW" sz="1400" dirty="0" err="1" smtClean="0"/>
+              <a:t>numElementsInRow</a:t>
+            </a:r>
+            <a:r>
+              <a:rPr lang="en-US" altLang="zh-TW" sz="1400" dirty="0" smtClean="0"/>
+              <a:t>)</a:t>
+            </a:r>
+            <a:endParaRPr lang="en-US" altLang="zh-TW" sz="1400" dirty="0" smtClean="0"/>
+          </a:p>
+          <a:p>
+            <a:r>
+              <a:rPr lang="en-US" altLang="zh-TW" sz="1400" dirty="0" smtClean="0"/>
+              <a:t>            lines[</a:t>
+            </a:r>
+            <a:r>
+              <a:rPr lang="en-US" altLang="zh-TW" sz="1400" dirty="0" err="1" smtClean="0"/>
+              <a:t>lineHead</a:t>
+            </a:r>
+            <a:r>
+              <a:rPr lang="en-US" altLang="zh-TW" sz="1400" dirty="0"/>
+              <a:t>].add(component</a:t>
+            </a:r>
+            <a:r>
+              <a:rPr lang="en-US" altLang="zh-TW" sz="1400" dirty="0" smtClean="0"/>
+              <a:t>);</a:t>
+            </a:r>
+          </a:p>
+          <a:p>
+            <a:r>
+              <a:rPr lang="en-US" altLang="zh-TW" sz="1400" dirty="0"/>
+              <a:t> </a:t>
+            </a:r>
+            <a:r>
+              <a:rPr lang="en-US" altLang="zh-TW" sz="1400" dirty="0" smtClean="0"/>
+              <a:t>           count = 0;</a:t>
+            </a:r>
+          </a:p>
+          <a:p>
+            <a:r>
+              <a:rPr lang="en-US" altLang="zh-TW" sz="1400" dirty="0" smtClean="0"/>
+              <a:t>        else</a:t>
+            </a:r>
+          </a:p>
+          <a:p>
+            <a:r>
+              <a:rPr lang="en-US" altLang="zh-TW" sz="1400" dirty="0"/>
+              <a:t> </a:t>
+            </a:r>
+            <a:r>
+              <a:rPr lang="en-US" altLang="zh-TW" sz="1400" dirty="0" smtClean="0"/>
+              <a:t>           </a:t>
+            </a:r>
+            <a:r>
+              <a:rPr lang="en-US" altLang="zh-TW" sz="1400" dirty="0" err="1" smtClean="0"/>
+              <a:t>lineHead</a:t>
+            </a:r>
+            <a:r>
+              <a:rPr lang="en-US" altLang="zh-TW" sz="1400" dirty="0" smtClean="0"/>
+              <a:t> </a:t>
+            </a:r>
+            <a:r>
+              <a:rPr lang="en-US" altLang="zh-TW" sz="1400" dirty="0"/>
+              <a:t>++;</a:t>
+            </a:r>
+            <a:endParaRPr lang="en-US" altLang="zh-TW" sz="1400" dirty="0" smtClean="0"/>
+          </a:p>
+          <a:p>
+            <a:r>
+              <a:rPr lang="en-US" altLang="zh-TW" sz="1400" dirty="0" smtClean="0"/>
+              <a:t>     }</a:t>
+            </a:r>
+          </a:p>
+          <a:p>
+            <a:r>
+              <a:rPr lang="en-US" altLang="zh-TW" sz="1400" dirty="0"/>
+              <a:t> </a:t>
+            </a:r>
+            <a:r>
+              <a:rPr lang="en-US" altLang="zh-TW" sz="1400" dirty="0" smtClean="0"/>
+              <a:t>   </a:t>
+            </a:r>
+            <a:r>
+              <a:rPr lang="en-US" altLang="zh-TW" sz="1400" dirty="0"/>
+              <a:t> return lines;</a:t>
+            </a:r>
+            <a:endParaRPr lang="en-US" altLang="zh-TW" sz="1400" dirty="0" smtClean="0"/>
+          </a:p>
+          <a:p>
+            <a:r>
+              <a:rPr lang="en-US" altLang="zh-TW" sz="1400" dirty="0"/>
+              <a:t>}</a:t>
+            </a:r>
+            <a:endParaRPr lang="zh-TW" altLang="en-US" sz="1400" dirty="0"/>
+          </a:p>
+        </p:txBody>
+      </p:sp>
+      <p:sp>
+        <p:nvSpPr>
+          <p:cNvPr id="3" name="文字方塊 2"/>
+          <p:cNvSpPr txBox="1"/>
+          <p:nvPr/>
+        </p:nvSpPr>
+        <p:spPr>
+          <a:xfrm>
+            <a:off x="107504" y="260648"/>
+            <a:ext cx="3079754" cy="2246769"/>
+          </a:xfrm>
+          <a:prstGeom prst="rect">
+            <a:avLst/>
+          </a:prstGeom>
+          <a:noFill/>
+          <a:ln>
+            <a:solidFill>
+              <a:schemeClr val="tx1"/>
+            </a:solidFill>
+          </a:ln>
+        </p:spPr>
+        <p:txBody>
+          <a:bodyPr wrap="none" rtlCol="0">
+            <a:spAutoFit/>
+          </a:bodyPr>
+          <a:lstStyle/>
+          <a:p>
+            <a:r>
+              <a:rPr lang="en-US" altLang="zh-TW" sz="1400" dirty="0" smtClean="0"/>
+              <a:t>arrange(Component </a:t>
+            </a:r>
+            <a:r>
+              <a:rPr lang="en-US" altLang="zh-TW" sz="1400" dirty="0" smtClean="0"/>
+              <a:t>[] components</a:t>
+            </a:r>
+            <a:r>
+              <a:rPr lang="en-US" altLang="zh-TW" sz="1400" dirty="0" smtClean="0"/>
+              <a:t>){</a:t>
+            </a:r>
+          </a:p>
+          <a:p>
+            <a:r>
+              <a:rPr lang="en-US" altLang="zh-TW" sz="1400" dirty="0"/>
+              <a:t> </a:t>
+            </a:r>
+            <a:r>
+              <a:rPr lang="en-US" altLang="zh-TW" sz="1400" dirty="0" smtClean="0"/>
+              <a:t>   </a:t>
+            </a:r>
+            <a:r>
+              <a:rPr lang="en-US" altLang="zh-TW" sz="1400" dirty="0"/>
+              <a:t>lines = new Line[</a:t>
+            </a:r>
+            <a:r>
+              <a:rPr lang="en-US" altLang="zh-TW" sz="1400" dirty="0" err="1"/>
+              <a:t>MaxLine</a:t>
+            </a:r>
+            <a:r>
+              <a:rPr lang="en-US" altLang="zh-TW" sz="1400" dirty="0" smtClean="0"/>
+              <a:t>];</a:t>
+            </a:r>
+            <a:endParaRPr lang="en-US" altLang="zh-TW" sz="1400" dirty="0" smtClean="0"/>
+          </a:p>
+          <a:p>
+            <a:r>
+              <a:rPr lang="en-US" altLang="zh-TW" sz="1400" dirty="0"/>
+              <a:t> </a:t>
+            </a:r>
+            <a:r>
+              <a:rPr lang="en-US" altLang="zh-TW" sz="1400" dirty="0" smtClean="0"/>
+              <a:t>   </a:t>
+            </a:r>
+            <a:r>
+              <a:rPr lang="en-US" altLang="zh-TW" sz="1400" dirty="0" err="1" smtClean="0"/>
+              <a:t>foreach</a:t>
+            </a:r>
+            <a:r>
+              <a:rPr lang="en-US" altLang="zh-TW" sz="1400" dirty="0" smtClean="0"/>
+              <a:t> </a:t>
+            </a:r>
+            <a:r>
+              <a:rPr lang="en-US" altLang="zh-TW" sz="1400" dirty="0" smtClean="0"/>
+              <a:t>component{</a:t>
+            </a:r>
+            <a:endParaRPr lang="en-US" altLang="zh-TW" sz="1400" dirty="0" smtClean="0"/>
+          </a:p>
+          <a:p>
+            <a:r>
+              <a:rPr lang="en-US" altLang="zh-TW" sz="1400" dirty="0"/>
+              <a:t> </a:t>
+            </a:r>
+            <a:r>
+              <a:rPr lang="en-US" altLang="zh-TW" sz="1400" dirty="0" smtClean="0"/>
+              <a:t>       </a:t>
+            </a:r>
+            <a:r>
+              <a:rPr lang="en-US" altLang="zh-TW" sz="1400" dirty="0" smtClean="0"/>
+              <a:t>if(</a:t>
+            </a:r>
+            <a:r>
+              <a:rPr lang="en-US" altLang="zh-TW" sz="1400" dirty="0" err="1" smtClean="0"/>
+              <a:t>addLineBreak</a:t>
+            </a:r>
+            <a:r>
+              <a:rPr lang="en-US" altLang="zh-TW" sz="1400" dirty="0" smtClean="0"/>
+              <a:t>())</a:t>
+            </a:r>
+            <a:endParaRPr lang="en-US" altLang="zh-TW" sz="1400" dirty="0" smtClean="0"/>
+          </a:p>
+          <a:p>
+            <a:r>
+              <a:rPr lang="en-US" altLang="zh-TW" sz="1400" dirty="0"/>
+              <a:t> </a:t>
+            </a:r>
+            <a:r>
+              <a:rPr lang="en-US" altLang="zh-TW" sz="1400" dirty="0" smtClean="0"/>
+              <a:t>           </a:t>
+            </a:r>
+            <a:r>
+              <a:rPr lang="en-US" altLang="zh-TW" sz="1400" dirty="0" err="1" smtClean="0"/>
+              <a:t>lineHead</a:t>
+            </a:r>
+            <a:r>
+              <a:rPr lang="en-US" altLang="zh-TW" sz="1400" dirty="0" smtClean="0"/>
+              <a:t> ++;</a:t>
+            </a:r>
+          </a:p>
+          <a:p>
+            <a:r>
+              <a:rPr lang="en-US" altLang="zh-TW" sz="1400" dirty="0"/>
+              <a:t> </a:t>
+            </a:r>
+            <a:r>
+              <a:rPr lang="en-US" altLang="zh-TW" sz="1400" dirty="0" smtClean="0"/>
+              <a:t>       else</a:t>
+            </a:r>
+          </a:p>
+          <a:p>
+            <a:r>
+              <a:rPr lang="en-US" altLang="zh-TW" sz="1400" dirty="0"/>
+              <a:t> </a:t>
+            </a:r>
+            <a:r>
+              <a:rPr lang="en-US" altLang="zh-TW" sz="1400" dirty="0" smtClean="0"/>
+              <a:t>           lines[</a:t>
+            </a:r>
+            <a:r>
+              <a:rPr lang="en-US" altLang="zh-TW" sz="1400" dirty="0" err="1" smtClean="0"/>
+              <a:t>lineHead</a:t>
+            </a:r>
+            <a:r>
+              <a:rPr lang="en-US" altLang="zh-TW" sz="1400" dirty="0" smtClean="0"/>
+              <a:t>].add(component);</a:t>
+            </a:r>
+            <a:endParaRPr lang="en-US" altLang="zh-TW" sz="1400" dirty="0" smtClean="0"/>
+          </a:p>
+          <a:p>
+            <a:r>
+              <a:rPr lang="en-US" altLang="zh-TW" sz="1400" dirty="0" smtClean="0"/>
+              <a:t>    </a:t>
+            </a:r>
+            <a:r>
+              <a:rPr lang="en-US" altLang="zh-TW" sz="1400" dirty="0" smtClean="0"/>
+              <a:t>}</a:t>
+            </a:r>
+          </a:p>
+          <a:p>
+            <a:r>
+              <a:rPr lang="en-US" altLang="zh-TW" sz="1400" dirty="0"/>
+              <a:t> </a:t>
+            </a:r>
+            <a:r>
+              <a:rPr lang="en-US" altLang="zh-TW" sz="1400" dirty="0" smtClean="0"/>
+              <a:t>   return lines;</a:t>
+            </a:r>
+            <a:endParaRPr lang="en-US" altLang="zh-TW" sz="1400" dirty="0" smtClean="0"/>
+          </a:p>
+          <a:p>
+            <a:r>
+              <a:rPr lang="en-US" altLang="zh-TW" sz="1400" dirty="0"/>
+              <a:t>}</a:t>
+            </a:r>
+            <a:endParaRPr lang="zh-TW" altLang="en-US" sz="1400" dirty="0"/>
+          </a:p>
+        </p:txBody>
+      </p:sp>
     </p:spTree>
     <p:extLst>
       <p:ext uri="{BB962C8B-B14F-4D97-AF65-F5344CB8AC3E}">

</xml_diff>